<commit_message>
Fix String conversion on slide 45
</commit_message>
<xml_diff>
--- a/curriculum/Unit2/Unit2.pptx
+++ b/curriculum/Unit2/Unit2.pptx
@@ -207,6 +207,10 @@
 </p:presentation>
 </file>
 
+<file path=ppt/revisionInfo.xml><?xml version="1.0" encoding="utf-8"?>
+<p1510:revInfo xmlns:a="http://schemas.openxmlformats.org/drawingml/2006/main" xmlns:r="http://schemas.openxmlformats.org/officeDocument/2006/relationships" xmlns:p1510="http://schemas.microsoft.com/office/powerpoint/2015/10/main"/>
+</file>
+
 <file path=ppt/notesMasters/notesMaster1.xml><?xml version="1.0" encoding="utf-8"?>
 <p:notesMaster xmlns:a="http://schemas.openxmlformats.org/drawingml/2006/main" xmlns:r="http://schemas.openxmlformats.org/officeDocument/2006/relationships" xmlns:p="http://schemas.openxmlformats.org/presentationml/2006/main">
   <p:cSld>
@@ -289,7 +293,7 @@
           <a:p>
             <a:fld id="{01EE7243-FE3C-4092-BCD1-A3CEC92C371A}" type="datetimeFigureOut">
               <a:rPr lang="en-US" smtClean="0"/>
-              <a:t>10/28/2016</a:t>
+              <a:t>9/29/2017</a:t>
             </a:fld>
             <a:endParaRPr lang="en-US"/>
           </a:p>
@@ -2607,7 +2611,7 @@
           <a:p>
             <a:fld id="{04E6A347-E849-4263-9BF9-31A91B9AAA7C}" type="datetimeFigureOut">
               <a:rPr lang="en-US" smtClean="0"/>
-              <a:t>10/28/2016</a:t>
+              <a:t>9/29/2017</a:t>
             </a:fld>
             <a:endParaRPr lang="en-US"/>
           </a:p>
@@ -2775,7 +2779,7 @@
           <a:p>
             <a:fld id="{04E6A347-E849-4263-9BF9-31A91B9AAA7C}" type="datetimeFigureOut">
               <a:rPr lang="en-US" smtClean="0"/>
-              <a:t>10/28/2016</a:t>
+              <a:t>9/29/2017</a:t>
             </a:fld>
             <a:endParaRPr lang="en-US"/>
           </a:p>
@@ -2953,7 +2957,7 @@
           <a:p>
             <a:fld id="{04E6A347-E849-4263-9BF9-31A91B9AAA7C}" type="datetimeFigureOut">
               <a:rPr lang="en-US" smtClean="0"/>
-              <a:t>10/28/2016</a:t>
+              <a:t>9/29/2017</a:t>
             </a:fld>
             <a:endParaRPr lang="en-US"/>
           </a:p>
@@ -3121,7 +3125,7 @@
           <a:p>
             <a:fld id="{04E6A347-E849-4263-9BF9-31A91B9AAA7C}" type="datetimeFigureOut">
               <a:rPr lang="en-US" smtClean="0"/>
-              <a:t>10/28/2016</a:t>
+              <a:t>9/29/2017</a:t>
             </a:fld>
             <a:endParaRPr lang="en-US"/>
           </a:p>
@@ -3366,7 +3370,7 @@
           <a:p>
             <a:fld id="{04E6A347-E849-4263-9BF9-31A91B9AAA7C}" type="datetimeFigureOut">
               <a:rPr lang="en-US" smtClean="0"/>
-              <a:t>10/28/2016</a:t>
+              <a:t>9/29/2017</a:t>
             </a:fld>
             <a:endParaRPr lang="en-US"/>
           </a:p>
@@ -3595,7 +3599,7 @@
           <a:p>
             <a:fld id="{04E6A347-E849-4263-9BF9-31A91B9AAA7C}" type="datetimeFigureOut">
               <a:rPr lang="en-US" smtClean="0"/>
-              <a:t>10/28/2016</a:t>
+              <a:t>9/29/2017</a:t>
             </a:fld>
             <a:endParaRPr lang="en-US"/>
           </a:p>
@@ -3959,7 +3963,7 @@
           <a:p>
             <a:fld id="{04E6A347-E849-4263-9BF9-31A91B9AAA7C}" type="datetimeFigureOut">
               <a:rPr lang="en-US" smtClean="0"/>
-              <a:t>10/28/2016</a:t>
+              <a:t>9/29/2017</a:t>
             </a:fld>
             <a:endParaRPr lang="en-US"/>
           </a:p>
@@ -4076,7 +4080,7 @@
           <a:p>
             <a:fld id="{04E6A347-E849-4263-9BF9-31A91B9AAA7C}" type="datetimeFigureOut">
               <a:rPr lang="en-US" smtClean="0"/>
-              <a:t>10/28/2016</a:t>
+              <a:t>9/29/2017</a:t>
             </a:fld>
             <a:endParaRPr lang="en-US"/>
           </a:p>
@@ -4171,7 +4175,7 @@
           <a:p>
             <a:fld id="{04E6A347-E849-4263-9BF9-31A91B9AAA7C}" type="datetimeFigureOut">
               <a:rPr lang="en-US" smtClean="0"/>
-              <a:t>10/28/2016</a:t>
+              <a:t>9/29/2017</a:t>
             </a:fld>
             <a:endParaRPr lang="en-US"/>
           </a:p>
@@ -4446,7 +4450,7 @@
           <a:p>
             <a:fld id="{04E6A347-E849-4263-9BF9-31A91B9AAA7C}" type="datetimeFigureOut">
               <a:rPr lang="en-US" smtClean="0"/>
-              <a:t>10/28/2016</a:t>
+              <a:t>9/29/2017</a:t>
             </a:fld>
             <a:endParaRPr lang="en-US"/>
           </a:p>
@@ -4698,7 +4702,7 @@
           <a:p>
             <a:fld id="{04E6A347-E849-4263-9BF9-31A91B9AAA7C}" type="datetimeFigureOut">
               <a:rPr lang="en-US" smtClean="0"/>
-              <a:t>10/28/2016</a:t>
+              <a:t>9/29/2017</a:t>
             </a:fld>
             <a:endParaRPr lang="en-US"/>
           </a:p>
@@ -4909,7 +4913,7 @@
           <a:p>
             <a:fld id="{04E6A347-E849-4263-9BF9-31A91B9AAA7C}" type="datetimeFigureOut">
               <a:rPr lang="en-US" smtClean="0"/>
-              <a:t>10/28/2016</a:t>
+              <a:t>9/29/2017</a:t>
             </a:fld>
             <a:endParaRPr lang="en-US"/>
           </a:p>
@@ -10903,7 +10907,9 @@
         </p:nvSpPr>
         <p:spPr/>
         <p:txBody>
-          <a:bodyPr/>
+          <a:bodyPr>
+            <a:normAutofit lnSpcReduction="10000"/>
+          </a:bodyPr>
           <a:lstStyle/>
           <a:p>
             <a:pPr marL="0" indent="0">
@@ -10943,7 +10949,7 @@
                 <a:latin typeface="Courier New" panose="02070309020205020404" pitchFamily="49" charset="0"/>
                 <a:cs typeface="Courier New" panose="02070309020205020404" pitchFamily="49" charset="0"/>
               </a:rPr>
-              <a:t>) 4.29 		=&gt; 	4</a:t>
+              <a:t>) 4.29 			=&gt; 	4</a:t>
             </a:r>
           </a:p>
           <a:p>
@@ -10955,19 +10961,26 @@
                 <a:latin typeface="Courier New" panose="02070309020205020404" pitchFamily="49" charset="0"/>
                 <a:cs typeface="Courier New" panose="02070309020205020404" pitchFamily="49" charset="0"/>
               </a:rPr>
-              <a:t>(double) 1 		=&gt; 	1.0</a:t>
-            </a:r>
-          </a:p>
-          <a:p>
-            <a:pPr marL="0" indent="0">
-              <a:buNone/>
-            </a:pPr>
+              <a:t>(double) 1 			=&gt; 	1.0</a:t>
+            </a:r>
+          </a:p>
+          <a:p>
+            <a:pPr marL="0" indent="0">
+              <a:buNone/>
+            </a:pPr>
+            <a:r>
+              <a:rPr lang="en-US" dirty="0" err="1">
+                <a:latin typeface="Courier New" panose="02070309020205020404" pitchFamily="49" charset="0"/>
+                <a:cs typeface="Courier New" panose="02070309020205020404" pitchFamily="49" charset="0"/>
+              </a:rPr>
+              <a:t>String.valueof</a:t>
+            </a:r>
             <a:r>
               <a:rPr lang="en-US" dirty="0">
                 <a:latin typeface="Courier New" panose="02070309020205020404" pitchFamily="49" charset="0"/>
                 <a:cs typeface="Courier New" panose="02070309020205020404" pitchFamily="49" charset="0"/>
               </a:rPr>
-              <a:t>(String) 4.892 	=&gt; 	“4.892”</a:t>
+              <a:t>(4.892)	=&gt; 	“4.892”</a:t>
             </a:r>
           </a:p>
           <a:p>
@@ -11004,7 +11017,33 @@
             </a:r>
             <a:r>
               <a:rPr lang="en-US" dirty="0"/>
-              <a:t> =/=&gt; ‘???’ </a:t>
+              <a:t> =/=&gt; ‘???’</a:t>
+            </a:r>
+          </a:p>
+          <a:p>
+            <a:pPr marL="0" indent="0">
+              <a:buNone/>
+            </a:pPr>
+            <a:endParaRPr lang="en-US" dirty="0"/>
+          </a:p>
+          <a:p>
+            <a:pPr marL="0" indent="0">
+              <a:buNone/>
+            </a:pPr>
+            <a:r>
+              <a:rPr lang="en-US" sz="2400" i="1" dirty="0"/>
+              <a:t>Note: </a:t>
+            </a:r>
+            <a:r>
+              <a:rPr lang="en-US" sz="2400" dirty="0">
+                <a:latin typeface="Courier New" panose="02070309020205020404" pitchFamily="49" charset="0"/>
+                <a:cs typeface="Courier New" panose="02070309020205020404" pitchFamily="49" charset="0"/>
+              </a:rPr>
+              <a:t>String</a:t>
+            </a:r>
+            <a:r>
+              <a:rPr lang="en-US" sz="2400" i="1" dirty="0"/>
+              <a:t> is not a primitive type and requires a method call to convert </a:t>
             </a:r>
           </a:p>
         </p:txBody>
@@ -17177,6 +17216,12 @@
 </file>
 
 <file path=customXml/item1.xml><?xml version="1.0" encoding="utf-8"?>
+<p:properties xmlns:p="http://schemas.microsoft.com/office/2006/metadata/properties" xmlns:xsi="http://www.w3.org/2001/XMLSchema-instance" xmlns:pc="http://schemas.microsoft.com/office/infopath/2007/PartnerControls">
+  <documentManagement/>
+</p:properties>
+</file>
+
+<file path=customXml/item2.xml><?xml version="1.0" encoding="utf-8"?>
 <?mso-contentType ?>
 <FormTemplates xmlns="http://schemas.microsoft.com/sharepoint/v3/contenttype/forms">
   <Display>DocumentLibraryForm</Display>
@@ -17185,7 +17230,7 @@
 </FormTemplates>
 </file>
 
-<file path=customXml/item2.xml><?xml version="1.0" encoding="utf-8"?>
+<file path=customXml/item3.xml><?xml version="1.0" encoding="utf-8"?>
 <ct:contentTypeSchema xmlns:ct="http://schemas.microsoft.com/office/2006/metadata/contentType" xmlns:ma="http://schemas.microsoft.com/office/2006/metadata/properties/metaAttributes" ct:_="" ma:_="" ma:contentTypeName="Document" ma:contentTypeID="0x010100BABADD3A0624AA4E97287821B8F4D7D6" ma:contentTypeVersion="3" ma:contentTypeDescription="Create a new document." ma:contentTypeScope="" ma:versionID="d1f55a70bd1930e0ae5c5588ea58d234">
   <xsd:schema xmlns:xsd="http://www.w3.org/2001/XMLSchema" xmlns:xs="http://www.w3.org/2001/XMLSchema" xmlns:p="http://schemas.microsoft.com/office/2006/metadata/properties" xmlns:ns2="5edd459b-714d-42ed-b78f-512da7d1c14e" targetNamespace="http://schemas.microsoft.com/office/2006/metadata/properties" ma:root="true" ma:fieldsID="5a6a6e2895642296b7d1775ae73bc200" ns2:_="">
     <xsd:import namespace="5edd459b-714d-42ed-b78f-512da7d1c14e"/>
@@ -17339,13 +17384,23 @@
 </ct:contentTypeSchema>
 </file>
 
-<file path=customXml/item3.xml><?xml version="1.0" encoding="utf-8"?>
-<p:properties xmlns:p="http://schemas.microsoft.com/office/2006/metadata/properties" xmlns:xsi="http://www.w3.org/2001/XMLSchema-instance" xmlns:pc="http://schemas.microsoft.com/office/infopath/2007/PartnerControls">
-  <documentManagement/>
-</p:properties>
+<file path=customXml/itemProps1.xml><?xml version="1.0" encoding="utf-8"?>
+<ds:datastoreItem xmlns:ds="http://schemas.openxmlformats.org/officeDocument/2006/customXml" ds:itemID="{137ABD09-FFEE-4830-B492-D9820D9FDFA2}">
+  <ds:schemaRefs>
+    <ds:schemaRef ds:uri="http://schemas.microsoft.com/office/infopath/2007/PartnerControls"/>
+    <ds:schemaRef ds:uri="http://purl.org/dc/elements/1.1/"/>
+    <ds:schemaRef ds:uri="http://schemas.microsoft.com/office/2006/metadata/properties"/>
+    <ds:schemaRef ds:uri="http://schemas.microsoft.com/office/2006/documentManagement/types"/>
+    <ds:schemaRef ds:uri="http://purl.org/dc/terms/"/>
+    <ds:schemaRef ds:uri="http://schemas.openxmlformats.org/package/2006/metadata/core-properties"/>
+    <ds:schemaRef ds:uri="5edd459b-714d-42ed-b78f-512da7d1c14e"/>
+    <ds:schemaRef ds:uri="http://purl.org/dc/dcmitype/"/>
+    <ds:schemaRef ds:uri="http://www.w3.org/XML/1998/namespace"/>
+  </ds:schemaRefs>
+</ds:datastoreItem>
 </file>
 
-<file path=customXml/itemProps1.xml><?xml version="1.0" encoding="utf-8"?>
+<file path=customXml/itemProps2.xml><?xml version="1.0" encoding="utf-8"?>
 <ds:datastoreItem xmlns:ds="http://schemas.openxmlformats.org/officeDocument/2006/customXml" ds:itemID="{D3F258A9-62F9-4AA7-BEBE-DE1957F67E4B}">
   <ds:schemaRefs>
     <ds:schemaRef ds:uri="http://schemas.microsoft.com/sharepoint/v3/contenttype/forms"/>
@@ -17353,7 +17408,7 @@
 </ds:datastoreItem>
 </file>
 
-<file path=customXml/itemProps2.xml><?xml version="1.0" encoding="utf-8"?>
+<file path=customXml/itemProps3.xml><?xml version="1.0" encoding="utf-8"?>
 <ds:datastoreItem xmlns:ds="http://schemas.openxmlformats.org/officeDocument/2006/customXml" ds:itemID="{9B436524-1E59-45A9-9022-9518E43CCB5C}">
   <ds:schemaRefs>
     <ds:schemaRef ds:uri="http://schemas.microsoft.com/office/2006/metadata/contentType"/>
@@ -17369,20 +17424,4 @@
     <ds:schemaRef ds:uri="http://schemas.microsoft.com/internal/obd"/>
   </ds:schemaRefs>
 </ds:datastoreItem>
-</file>
-
-<file path=customXml/itemProps3.xml><?xml version="1.0" encoding="utf-8"?>
-<ds:datastoreItem xmlns:ds="http://schemas.openxmlformats.org/officeDocument/2006/customXml" ds:itemID="{137ABD09-FFEE-4830-B492-D9820D9FDFA2}">
-  <ds:schemaRefs>
-    <ds:schemaRef ds:uri="http://schemas.microsoft.com/office/infopath/2007/PartnerControls"/>
-    <ds:schemaRef ds:uri="http://purl.org/dc/elements/1.1/"/>
-    <ds:schemaRef ds:uri="http://schemas.microsoft.com/office/2006/metadata/properties"/>
-    <ds:schemaRef ds:uri="http://schemas.microsoft.com/office/2006/documentManagement/types"/>
-    <ds:schemaRef ds:uri="http://purl.org/dc/terms/"/>
-    <ds:schemaRef ds:uri="http://schemas.openxmlformats.org/package/2006/metadata/core-properties"/>
-    <ds:schemaRef ds:uri="5edd459b-714d-42ed-b78f-512da7d1c14e"/>
-    <ds:schemaRef ds:uri="http://purl.org/dc/dcmitype/"/>
-    <ds:schemaRef ds:uri="http://www.w3.org/XML/1998/namespace"/>
-  </ds:schemaRefs>
-</ds:datastoreItem>
 </file>
</xml_diff>

<commit_message>
Replace ASCII art with proper Unicode (slide 45)
</commit_message>
<xml_diff>
--- a/curriculum/Unit2/Unit2.pptx
+++ b/curriculum/Unit2/Unit2.pptx
@@ -293,7 +293,7 @@
           <a:p>
             <a:fld id="{01EE7243-FE3C-4092-BCD1-A3CEC92C371A}" type="datetimeFigureOut">
               <a:rPr lang="en-US" smtClean="0"/>
-              <a:t>9/29/2017</a:t>
+              <a:t>2017-09-29</a:t>
             </a:fld>
             <a:endParaRPr lang="en-US"/>
           </a:p>
@@ -2611,7 +2611,7 @@
           <a:p>
             <a:fld id="{04E6A347-E849-4263-9BF9-31A91B9AAA7C}" type="datetimeFigureOut">
               <a:rPr lang="en-US" smtClean="0"/>
-              <a:t>9/29/2017</a:t>
+              <a:t>2017-09-29</a:t>
             </a:fld>
             <a:endParaRPr lang="en-US"/>
           </a:p>
@@ -2779,7 +2779,7 @@
           <a:p>
             <a:fld id="{04E6A347-E849-4263-9BF9-31A91B9AAA7C}" type="datetimeFigureOut">
               <a:rPr lang="en-US" smtClean="0"/>
-              <a:t>9/29/2017</a:t>
+              <a:t>2017-09-29</a:t>
             </a:fld>
             <a:endParaRPr lang="en-US"/>
           </a:p>
@@ -2957,7 +2957,7 @@
           <a:p>
             <a:fld id="{04E6A347-E849-4263-9BF9-31A91B9AAA7C}" type="datetimeFigureOut">
               <a:rPr lang="en-US" smtClean="0"/>
-              <a:t>9/29/2017</a:t>
+              <a:t>2017-09-29</a:t>
             </a:fld>
             <a:endParaRPr lang="en-US"/>
           </a:p>
@@ -3125,7 +3125,7 @@
           <a:p>
             <a:fld id="{04E6A347-E849-4263-9BF9-31A91B9AAA7C}" type="datetimeFigureOut">
               <a:rPr lang="en-US" smtClean="0"/>
-              <a:t>9/29/2017</a:t>
+              <a:t>2017-09-29</a:t>
             </a:fld>
             <a:endParaRPr lang="en-US"/>
           </a:p>
@@ -3370,7 +3370,7 @@
           <a:p>
             <a:fld id="{04E6A347-E849-4263-9BF9-31A91B9AAA7C}" type="datetimeFigureOut">
               <a:rPr lang="en-US" smtClean="0"/>
-              <a:t>9/29/2017</a:t>
+              <a:t>2017-09-29</a:t>
             </a:fld>
             <a:endParaRPr lang="en-US"/>
           </a:p>
@@ -3599,7 +3599,7 @@
           <a:p>
             <a:fld id="{04E6A347-E849-4263-9BF9-31A91B9AAA7C}" type="datetimeFigureOut">
               <a:rPr lang="en-US" smtClean="0"/>
-              <a:t>9/29/2017</a:t>
+              <a:t>2017-09-29</a:t>
             </a:fld>
             <a:endParaRPr lang="en-US"/>
           </a:p>
@@ -3963,7 +3963,7 @@
           <a:p>
             <a:fld id="{04E6A347-E849-4263-9BF9-31A91B9AAA7C}" type="datetimeFigureOut">
               <a:rPr lang="en-US" smtClean="0"/>
-              <a:t>9/29/2017</a:t>
+              <a:t>2017-09-29</a:t>
             </a:fld>
             <a:endParaRPr lang="en-US"/>
           </a:p>
@@ -4080,7 +4080,7 @@
           <a:p>
             <a:fld id="{04E6A347-E849-4263-9BF9-31A91B9AAA7C}" type="datetimeFigureOut">
               <a:rPr lang="en-US" smtClean="0"/>
-              <a:t>9/29/2017</a:t>
+              <a:t>2017-09-29</a:t>
             </a:fld>
             <a:endParaRPr lang="en-US"/>
           </a:p>
@@ -4175,7 +4175,7 @@
           <a:p>
             <a:fld id="{04E6A347-E849-4263-9BF9-31A91B9AAA7C}" type="datetimeFigureOut">
               <a:rPr lang="en-US" smtClean="0"/>
-              <a:t>9/29/2017</a:t>
+              <a:t>2017-09-29</a:t>
             </a:fld>
             <a:endParaRPr lang="en-US"/>
           </a:p>
@@ -4450,7 +4450,7 @@
           <a:p>
             <a:fld id="{04E6A347-E849-4263-9BF9-31A91B9AAA7C}" type="datetimeFigureOut">
               <a:rPr lang="en-US" smtClean="0"/>
-              <a:t>9/29/2017</a:t>
+              <a:t>2017-09-29</a:t>
             </a:fld>
             <a:endParaRPr lang="en-US"/>
           </a:p>
@@ -4702,7 +4702,7 @@
           <a:p>
             <a:fld id="{04E6A347-E849-4263-9BF9-31A91B9AAA7C}" type="datetimeFigureOut">
               <a:rPr lang="en-US" smtClean="0"/>
-              <a:t>9/29/2017</a:t>
+              <a:t>2017-09-29</a:t>
             </a:fld>
             <a:endParaRPr lang="en-US"/>
           </a:p>
@@ -4913,7 +4913,7 @@
           <a:p>
             <a:fld id="{04E6A347-E849-4263-9BF9-31A91B9AAA7C}" type="datetimeFigureOut">
               <a:rPr lang="en-US" smtClean="0"/>
-              <a:t>9/29/2017</a:t>
+              <a:t>2017-09-29</a:t>
             </a:fld>
             <a:endParaRPr lang="en-US"/>
           </a:p>
@@ -10949,7 +10949,7 @@
                 <a:latin typeface="Courier New" panose="02070309020205020404" pitchFamily="49" charset="0"/>
                 <a:cs typeface="Courier New" panose="02070309020205020404" pitchFamily="49" charset="0"/>
               </a:rPr>
-              <a:t>) 4.29 			=&gt; 	4</a:t>
+              <a:t>) 4.29 			⇒ 	4</a:t>
             </a:r>
           </a:p>
           <a:p>
@@ -10961,7 +10961,7 @@
                 <a:latin typeface="Courier New" panose="02070309020205020404" pitchFamily="49" charset="0"/>
                 <a:cs typeface="Courier New" panose="02070309020205020404" pitchFamily="49" charset="0"/>
               </a:rPr>
-              <a:t>(double) 1 			=&gt; 	1.0</a:t>
+              <a:t>(double) 1 			⇒ 	1.0</a:t>
             </a:r>
           </a:p>
           <a:p>
@@ -10980,7 +10980,7 @@
                 <a:latin typeface="Courier New" panose="02070309020205020404" pitchFamily="49" charset="0"/>
                 <a:cs typeface="Courier New" panose="02070309020205020404" pitchFamily="49" charset="0"/>
               </a:rPr>
-              <a:t>(4.892)	=&gt; 	“4.892”</a:t>
+              <a:t>(4.892)	⇒ 	“4.892”</a:t>
             </a:r>
           </a:p>
           <a:p>
@@ -11013,12 +11013,20 @@
                 <a:latin typeface="Courier New" panose="02070309020205020404" pitchFamily="49" charset="0"/>
                 <a:cs typeface="Courier New" panose="02070309020205020404" pitchFamily="49" charset="0"/>
               </a:rPr>
-              <a:t>) “String”</a:t>
-            </a:r>
-            <a:r>
-              <a:rPr lang="en-US" dirty="0"/>
-              <a:t> =/=&gt; ‘???’</a:t>
-            </a:r>
+              <a:t>) “String</a:t>
+            </a:r>
+            <a:r>
+              <a:rPr lang="en-US">
+                <a:latin typeface="Courier New" panose="02070309020205020404" pitchFamily="49" charset="0"/>
+                <a:cs typeface="Courier New" panose="02070309020205020404" pitchFamily="49" charset="0"/>
+              </a:rPr>
+              <a:t>”</a:t>
+            </a:r>
+            <a:r>
+              <a:rPr lang="en-US"/>
+              <a:t> ⇏ ???</a:t>
+            </a:r>
+            <a:endParaRPr lang="en-US" dirty="0"/>
           </a:p>
           <a:p>
             <a:pPr marL="0" indent="0">
@@ -11043,7 +11051,7 @@
             </a:r>
             <a:r>
               <a:rPr lang="en-US" sz="2400" i="1" dirty="0"/>
-              <a:t> is not a primitive type and requires a method call to convert </a:t>
+              <a:t> is not a primitive type, and requires a method call to convert </a:t>
             </a:r>
           </a:p>
         </p:txBody>
@@ -17216,12 +17224,6 @@
 </file>
 
 <file path=customXml/item1.xml><?xml version="1.0" encoding="utf-8"?>
-<p:properties xmlns:p="http://schemas.microsoft.com/office/2006/metadata/properties" xmlns:xsi="http://www.w3.org/2001/XMLSchema-instance" xmlns:pc="http://schemas.microsoft.com/office/infopath/2007/PartnerControls">
-  <documentManagement/>
-</p:properties>
-</file>
-
-<file path=customXml/item2.xml><?xml version="1.0" encoding="utf-8"?>
 <?mso-contentType ?>
 <FormTemplates xmlns="http://schemas.microsoft.com/sharepoint/v3/contenttype/forms">
   <Display>DocumentLibraryForm</Display>
@@ -17230,7 +17232,7 @@
 </FormTemplates>
 </file>
 
-<file path=customXml/item3.xml><?xml version="1.0" encoding="utf-8"?>
+<file path=customXml/item2.xml><?xml version="1.0" encoding="utf-8"?>
 <ct:contentTypeSchema xmlns:ct="http://schemas.microsoft.com/office/2006/metadata/contentType" xmlns:ma="http://schemas.microsoft.com/office/2006/metadata/properties/metaAttributes" ct:_="" ma:_="" ma:contentTypeName="Document" ma:contentTypeID="0x010100BABADD3A0624AA4E97287821B8F4D7D6" ma:contentTypeVersion="3" ma:contentTypeDescription="Create a new document." ma:contentTypeScope="" ma:versionID="d1f55a70bd1930e0ae5c5588ea58d234">
   <xsd:schema xmlns:xsd="http://www.w3.org/2001/XMLSchema" xmlns:xs="http://www.w3.org/2001/XMLSchema" xmlns:p="http://schemas.microsoft.com/office/2006/metadata/properties" xmlns:ns2="5edd459b-714d-42ed-b78f-512da7d1c14e" targetNamespace="http://schemas.microsoft.com/office/2006/metadata/properties" ma:root="true" ma:fieldsID="5a6a6e2895642296b7d1775ae73bc200" ns2:_="">
     <xsd:import namespace="5edd459b-714d-42ed-b78f-512da7d1c14e"/>
@@ -17384,23 +17386,13 @@
 </ct:contentTypeSchema>
 </file>
 
-<file path=customXml/itemProps1.xml><?xml version="1.0" encoding="utf-8"?>
-<ds:datastoreItem xmlns:ds="http://schemas.openxmlformats.org/officeDocument/2006/customXml" ds:itemID="{137ABD09-FFEE-4830-B492-D9820D9FDFA2}">
-  <ds:schemaRefs>
-    <ds:schemaRef ds:uri="http://schemas.microsoft.com/office/infopath/2007/PartnerControls"/>
-    <ds:schemaRef ds:uri="http://purl.org/dc/elements/1.1/"/>
-    <ds:schemaRef ds:uri="http://schemas.microsoft.com/office/2006/metadata/properties"/>
-    <ds:schemaRef ds:uri="http://schemas.microsoft.com/office/2006/documentManagement/types"/>
-    <ds:schemaRef ds:uri="http://purl.org/dc/terms/"/>
-    <ds:schemaRef ds:uri="http://schemas.openxmlformats.org/package/2006/metadata/core-properties"/>
-    <ds:schemaRef ds:uri="5edd459b-714d-42ed-b78f-512da7d1c14e"/>
-    <ds:schemaRef ds:uri="http://purl.org/dc/dcmitype/"/>
-    <ds:schemaRef ds:uri="http://www.w3.org/XML/1998/namespace"/>
-  </ds:schemaRefs>
-</ds:datastoreItem>
+<file path=customXml/item3.xml><?xml version="1.0" encoding="utf-8"?>
+<p:properties xmlns:p="http://schemas.microsoft.com/office/2006/metadata/properties" xmlns:xsi="http://www.w3.org/2001/XMLSchema-instance" xmlns:pc="http://schemas.microsoft.com/office/infopath/2007/PartnerControls">
+  <documentManagement/>
+</p:properties>
 </file>
 
-<file path=customXml/itemProps2.xml><?xml version="1.0" encoding="utf-8"?>
+<file path=customXml/itemProps1.xml><?xml version="1.0" encoding="utf-8"?>
 <ds:datastoreItem xmlns:ds="http://schemas.openxmlformats.org/officeDocument/2006/customXml" ds:itemID="{D3F258A9-62F9-4AA7-BEBE-DE1957F67E4B}">
   <ds:schemaRefs>
     <ds:schemaRef ds:uri="http://schemas.microsoft.com/sharepoint/v3/contenttype/forms"/>
@@ -17408,7 +17400,7 @@
 </ds:datastoreItem>
 </file>
 
-<file path=customXml/itemProps3.xml><?xml version="1.0" encoding="utf-8"?>
+<file path=customXml/itemProps2.xml><?xml version="1.0" encoding="utf-8"?>
 <ds:datastoreItem xmlns:ds="http://schemas.openxmlformats.org/officeDocument/2006/customXml" ds:itemID="{9B436524-1E59-45A9-9022-9518E43CCB5C}">
   <ds:schemaRefs>
     <ds:schemaRef ds:uri="http://schemas.microsoft.com/office/2006/metadata/contentType"/>
@@ -17424,4 +17416,20 @@
     <ds:schemaRef ds:uri="http://schemas.microsoft.com/internal/obd"/>
   </ds:schemaRefs>
 </ds:datastoreItem>
+</file>
+
+<file path=customXml/itemProps3.xml><?xml version="1.0" encoding="utf-8"?>
+<ds:datastoreItem xmlns:ds="http://schemas.openxmlformats.org/officeDocument/2006/customXml" ds:itemID="{137ABD09-FFEE-4830-B492-D9820D9FDFA2}">
+  <ds:schemaRefs>
+    <ds:schemaRef ds:uri="http://schemas.microsoft.com/office/infopath/2007/PartnerControls"/>
+    <ds:schemaRef ds:uri="http://purl.org/dc/elements/1.1/"/>
+    <ds:schemaRef ds:uri="http://schemas.microsoft.com/office/2006/metadata/properties"/>
+    <ds:schemaRef ds:uri="http://schemas.microsoft.com/office/2006/documentManagement/types"/>
+    <ds:schemaRef ds:uri="http://purl.org/dc/terms/"/>
+    <ds:schemaRef ds:uri="http://schemas.openxmlformats.org/package/2006/metadata/core-properties"/>
+    <ds:schemaRef ds:uri="5edd459b-714d-42ed-b78f-512da7d1c14e"/>
+    <ds:schemaRef ds:uri="http://purl.org/dc/dcmitype/"/>
+    <ds:schemaRef ds:uri="http://www.w3.org/XML/1998/namespace"/>
+  </ds:schemaRefs>
+</ds:datastoreItem>
 </file>
</xml_diff>

<commit_message>
Move String cast to note
Since String conversion is not a cast, it has been moved a note.  I changed the cast to use implicit String conversion in concatenation for two reasons. 1) the AP CS A Java subset states down in note 5: "String concatenation + is part of the AP Java subset.  Students are expected to know that concatenation converts numbers to strings and invokes toString on objects. And 2) the "" + is consistent with how the text book "Building Java Programs" converts numbers to Strings.
</commit_message>
<xml_diff>
--- a/curriculum/Unit2/Unit2.pptx
+++ b/curriculum/Unit2/Unit2.pptx
@@ -293,7 +293,7 @@
           <a:p>
             <a:fld id="{01EE7243-FE3C-4092-BCD1-A3CEC92C371A}" type="datetimeFigureOut">
               <a:rPr lang="en-US" smtClean="0"/>
-              <a:t>2017-09-29</a:t>
+              <a:t>9/30/2017</a:t>
             </a:fld>
             <a:endParaRPr lang="en-US"/>
           </a:p>
@@ -2611,7 +2611,7 @@
           <a:p>
             <a:fld id="{04E6A347-E849-4263-9BF9-31A91B9AAA7C}" type="datetimeFigureOut">
               <a:rPr lang="en-US" smtClean="0"/>
-              <a:t>2017-09-29</a:t>
+              <a:t>9/30/2017</a:t>
             </a:fld>
             <a:endParaRPr lang="en-US"/>
           </a:p>
@@ -2779,7 +2779,7 @@
           <a:p>
             <a:fld id="{04E6A347-E849-4263-9BF9-31A91B9AAA7C}" type="datetimeFigureOut">
               <a:rPr lang="en-US" smtClean="0"/>
-              <a:t>2017-09-29</a:t>
+              <a:t>9/30/2017</a:t>
             </a:fld>
             <a:endParaRPr lang="en-US"/>
           </a:p>
@@ -2957,7 +2957,7 @@
           <a:p>
             <a:fld id="{04E6A347-E849-4263-9BF9-31A91B9AAA7C}" type="datetimeFigureOut">
               <a:rPr lang="en-US" smtClean="0"/>
-              <a:t>2017-09-29</a:t>
+              <a:t>9/30/2017</a:t>
             </a:fld>
             <a:endParaRPr lang="en-US"/>
           </a:p>
@@ -3125,7 +3125,7 @@
           <a:p>
             <a:fld id="{04E6A347-E849-4263-9BF9-31A91B9AAA7C}" type="datetimeFigureOut">
               <a:rPr lang="en-US" smtClean="0"/>
-              <a:t>2017-09-29</a:t>
+              <a:t>9/30/2017</a:t>
             </a:fld>
             <a:endParaRPr lang="en-US"/>
           </a:p>
@@ -3370,7 +3370,7 @@
           <a:p>
             <a:fld id="{04E6A347-E849-4263-9BF9-31A91B9AAA7C}" type="datetimeFigureOut">
               <a:rPr lang="en-US" smtClean="0"/>
-              <a:t>2017-09-29</a:t>
+              <a:t>9/30/2017</a:t>
             </a:fld>
             <a:endParaRPr lang="en-US"/>
           </a:p>
@@ -3599,7 +3599,7 @@
           <a:p>
             <a:fld id="{04E6A347-E849-4263-9BF9-31A91B9AAA7C}" type="datetimeFigureOut">
               <a:rPr lang="en-US" smtClean="0"/>
-              <a:t>2017-09-29</a:t>
+              <a:t>9/30/2017</a:t>
             </a:fld>
             <a:endParaRPr lang="en-US"/>
           </a:p>
@@ -3963,7 +3963,7 @@
           <a:p>
             <a:fld id="{04E6A347-E849-4263-9BF9-31A91B9AAA7C}" type="datetimeFigureOut">
               <a:rPr lang="en-US" smtClean="0"/>
-              <a:t>2017-09-29</a:t>
+              <a:t>9/30/2017</a:t>
             </a:fld>
             <a:endParaRPr lang="en-US"/>
           </a:p>
@@ -4080,7 +4080,7 @@
           <a:p>
             <a:fld id="{04E6A347-E849-4263-9BF9-31A91B9AAA7C}" type="datetimeFigureOut">
               <a:rPr lang="en-US" smtClean="0"/>
-              <a:t>2017-09-29</a:t>
+              <a:t>9/30/2017</a:t>
             </a:fld>
             <a:endParaRPr lang="en-US"/>
           </a:p>
@@ -4175,7 +4175,7 @@
           <a:p>
             <a:fld id="{04E6A347-E849-4263-9BF9-31A91B9AAA7C}" type="datetimeFigureOut">
               <a:rPr lang="en-US" smtClean="0"/>
-              <a:t>2017-09-29</a:t>
+              <a:t>9/30/2017</a:t>
             </a:fld>
             <a:endParaRPr lang="en-US"/>
           </a:p>
@@ -4450,7 +4450,7 @@
           <a:p>
             <a:fld id="{04E6A347-E849-4263-9BF9-31A91B9AAA7C}" type="datetimeFigureOut">
               <a:rPr lang="en-US" smtClean="0"/>
-              <a:t>2017-09-29</a:t>
+              <a:t>9/30/2017</a:t>
             </a:fld>
             <a:endParaRPr lang="en-US"/>
           </a:p>
@@ -4702,7 +4702,7 @@
           <a:p>
             <a:fld id="{04E6A347-E849-4263-9BF9-31A91B9AAA7C}" type="datetimeFigureOut">
               <a:rPr lang="en-US" smtClean="0"/>
-              <a:t>2017-09-29</a:t>
+              <a:t>9/30/2017</a:t>
             </a:fld>
             <a:endParaRPr lang="en-US"/>
           </a:p>
@@ -4913,7 +4913,7 @@
           <a:p>
             <a:fld id="{04E6A347-E849-4263-9BF9-31A91B9AAA7C}" type="datetimeFigureOut">
               <a:rPr lang="en-US" smtClean="0"/>
-              <a:t>2017-09-29</a:t>
+              <a:t>9/30/2017</a:t>
             </a:fld>
             <a:endParaRPr lang="en-US"/>
           </a:p>
@@ -10908,22 +10908,13 @@
         <p:spPr/>
         <p:txBody>
           <a:bodyPr>
-            <a:normAutofit lnSpcReduction="10000"/>
+            <a:normAutofit/>
           </a:bodyPr>
           <a:lstStyle/>
           <a:p>
             <a:pPr marL="0" indent="0">
               <a:buNone/>
             </a:pPr>
-            <a:r>
-              <a:rPr lang="en-US" dirty="0"/>
-              <a:t>What happens if you want to preserve the human race?</a:t>
-            </a:r>
-          </a:p>
-          <a:p>
-            <a:pPr marL="0" indent="0">
-              <a:buNone/>
-            </a:pPr>
             <a:endParaRPr lang="en-US" dirty="0"/>
           </a:p>
           <a:p>
@@ -10949,7 +10940,7 @@
                 <a:latin typeface="Courier New" panose="02070309020205020404" pitchFamily="49" charset="0"/>
                 <a:cs typeface="Courier New" panose="02070309020205020404" pitchFamily="49" charset="0"/>
               </a:rPr>
-              <a:t>) 4.29 			⇒ 	4</a:t>
+              <a:t>) 4.29 		⇒ 	4</a:t>
             </a:r>
           </a:p>
           <a:p>
@@ -10961,72 +10952,8 @@
                 <a:latin typeface="Courier New" panose="02070309020205020404" pitchFamily="49" charset="0"/>
                 <a:cs typeface="Courier New" panose="02070309020205020404" pitchFamily="49" charset="0"/>
               </a:rPr>
-              <a:t>(double) 1 			⇒ 	1.0</a:t>
-            </a:r>
-          </a:p>
-          <a:p>
-            <a:pPr marL="0" indent="0">
-              <a:buNone/>
-            </a:pPr>
-            <a:r>
-              <a:rPr lang="en-US" dirty="0" err="1">
-                <a:latin typeface="Courier New" panose="02070309020205020404" pitchFamily="49" charset="0"/>
-                <a:cs typeface="Courier New" panose="02070309020205020404" pitchFamily="49" charset="0"/>
-              </a:rPr>
-              <a:t>String.valueof</a:t>
-            </a:r>
-            <a:r>
-              <a:rPr lang="en-US" dirty="0">
-                <a:latin typeface="Courier New" panose="02070309020205020404" pitchFamily="49" charset="0"/>
-                <a:cs typeface="Courier New" panose="02070309020205020404" pitchFamily="49" charset="0"/>
-              </a:rPr>
-              <a:t>(4.892)	⇒ 	“4.892”</a:t>
-            </a:r>
-          </a:p>
-          <a:p>
-            <a:endParaRPr lang="en-US" dirty="0"/>
-          </a:p>
-          <a:p>
-            <a:pPr marL="0" indent="0">
-              <a:buNone/>
-            </a:pPr>
-            <a:r>
-              <a:rPr lang="en-US" dirty="0"/>
-              <a:t>But, zombies can never be turned back: </a:t>
-            </a:r>
-            <a:r>
-              <a:rPr lang="en-US" dirty="0">
-                <a:latin typeface="Courier New" panose="02070309020205020404" pitchFamily="49" charset="0"/>
-                <a:cs typeface="Courier New" panose="02070309020205020404" pitchFamily="49" charset="0"/>
-              </a:rPr>
-              <a:t>(</a:t>
-            </a:r>
-            <a:r>
-              <a:rPr lang="en-US" dirty="0" err="1">
-                <a:latin typeface="Courier New" panose="02070309020205020404" pitchFamily="49" charset="0"/>
-                <a:cs typeface="Courier New" panose="02070309020205020404" pitchFamily="49" charset="0"/>
-              </a:rPr>
-              <a:t>int</a:t>
-            </a:r>
-            <a:r>
-              <a:rPr lang="en-US" dirty="0">
-                <a:latin typeface="Courier New" panose="02070309020205020404" pitchFamily="49" charset="0"/>
-                <a:cs typeface="Courier New" panose="02070309020205020404" pitchFamily="49" charset="0"/>
-              </a:rPr>
-              <a:t>) “String</a:t>
-            </a:r>
-            <a:r>
-              <a:rPr lang="en-US">
-                <a:latin typeface="Courier New" panose="02070309020205020404" pitchFamily="49" charset="0"/>
-                <a:cs typeface="Courier New" panose="02070309020205020404" pitchFamily="49" charset="0"/>
-              </a:rPr>
-              <a:t>”</a:t>
-            </a:r>
-            <a:r>
-              <a:rPr lang="en-US"/>
-              <a:t> ⇏ ???</a:t>
-            </a:r>
-            <a:endParaRPr lang="en-US" dirty="0"/>
+              <a:t>(double) 1 		⇒ 	1.0</a:t>
+            </a:r>
           </a:p>
           <a:p>
             <a:pPr marL="0" indent="0">
@@ -11051,8 +10978,56 @@
             </a:r>
             <a:r>
               <a:rPr lang="en-US" sz="2400" i="1" dirty="0"/>
-              <a:t> is not a primitive type, and requires a method call to convert </a:t>
-            </a:r>
+              <a:t> is not a primitive type and cannot be cast.  Java will convert </a:t>
+            </a:r>
+            <a:r>
+              <a:rPr lang="en-US" sz="2400" dirty="0" err="1">
+                <a:latin typeface="Courier New" panose="02070309020205020404" pitchFamily="49" charset="0"/>
+                <a:cs typeface="Courier New" panose="02070309020205020404" pitchFamily="49" charset="0"/>
+              </a:rPr>
+              <a:t>int</a:t>
+            </a:r>
+            <a:r>
+              <a:rPr lang="en-US" sz="2400" i="1" dirty="0"/>
+              <a:t> </a:t>
+            </a:r>
+            <a:r>
+              <a:rPr lang="en-US" sz="2400" i="1"/>
+              <a:t>and </a:t>
+            </a:r>
+            <a:r>
+              <a:rPr lang="en-US" sz="2400">
+                <a:latin typeface="Courier New" panose="02070309020205020404" pitchFamily="49" charset="0"/>
+                <a:cs typeface="Courier New" panose="02070309020205020404" pitchFamily="49" charset="0"/>
+              </a:rPr>
+              <a:t>double</a:t>
+            </a:r>
+            <a:r>
+              <a:rPr lang="en-US" sz="2400" i="1"/>
+              <a:t> to </a:t>
+            </a:r>
+            <a:r>
+              <a:rPr lang="en-US" sz="2400" i="1" dirty="0"/>
+              <a:t>strings when concatenated with a string.</a:t>
+            </a:r>
+          </a:p>
+          <a:p>
+            <a:pPr marL="0" indent="0">
+              <a:buNone/>
+            </a:pPr>
+            <a:r>
+              <a:rPr lang="en-US" sz="2400" dirty="0">
+                <a:latin typeface="Courier New" panose="02070309020205020404" pitchFamily="49" charset="0"/>
+                <a:cs typeface="Courier New" panose="02070309020205020404" pitchFamily="49" charset="0"/>
+              </a:rPr>
+              <a:t>	“” + 4.892		⇒ 	“4.892”</a:t>
+            </a:r>
+          </a:p>
+          <a:p>
+            <a:pPr marL="0" indent="0">
+              <a:buNone/>
+            </a:pPr>
+            <a:endParaRPr lang="en-US" sz="2400" i="1" dirty="0"/>
           </a:p>
         </p:txBody>
       </p:sp>
@@ -17224,15 +17199,6 @@
 </file>
 
 <file path=customXml/item1.xml><?xml version="1.0" encoding="utf-8"?>
-<?mso-contentType ?>
-<FormTemplates xmlns="http://schemas.microsoft.com/sharepoint/v3/contenttype/forms">
-  <Display>DocumentLibraryForm</Display>
-  <Edit>DocumentLibraryForm</Edit>
-  <New>DocumentLibraryForm</New>
-</FormTemplates>
-</file>
-
-<file path=customXml/item2.xml><?xml version="1.0" encoding="utf-8"?>
 <ct:contentTypeSchema xmlns:ct="http://schemas.microsoft.com/office/2006/metadata/contentType" xmlns:ma="http://schemas.microsoft.com/office/2006/metadata/properties/metaAttributes" ct:_="" ma:_="" ma:contentTypeName="Document" ma:contentTypeID="0x010100BABADD3A0624AA4E97287821B8F4D7D6" ma:contentTypeVersion="3" ma:contentTypeDescription="Create a new document." ma:contentTypeScope="" ma:versionID="d1f55a70bd1930e0ae5c5588ea58d234">
   <xsd:schema xmlns:xsd="http://www.w3.org/2001/XMLSchema" xmlns:xs="http://www.w3.org/2001/XMLSchema" xmlns:p="http://schemas.microsoft.com/office/2006/metadata/properties" xmlns:ns2="5edd459b-714d-42ed-b78f-512da7d1c14e" targetNamespace="http://schemas.microsoft.com/office/2006/metadata/properties" ma:root="true" ma:fieldsID="5a6a6e2895642296b7d1775ae73bc200" ns2:_="">
     <xsd:import namespace="5edd459b-714d-42ed-b78f-512da7d1c14e"/>
@@ -17386,21 +17352,22 @@
 </ct:contentTypeSchema>
 </file>
 
-<file path=customXml/item3.xml><?xml version="1.0" encoding="utf-8"?>
+<file path=customXml/item2.xml><?xml version="1.0" encoding="utf-8"?>
 <p:properties xmlns:p="http://schemas.microsoft.com/office/2006/metadata/properties" xmlns:xsi="http://www.w3.org/2001/XMLSchema-instance" xmlns:pc="http://schemas.microsoft.com/office/infopath/2007/PartnerControls">
   <documentManagement/>
 </p:properties>
 </file>
 
-<file path=customXml/itemProps1.xml><?xml version="1.0" encoding="utf-8"?>
-<ds:datastoreItem xmlns:ds="http://schemas.openxmlformats.org/officeDocument/2006/customXml" ds:itemID="{D3F258A9-62F9-4AA7-BEBE-DE1957F67E4B}">
-  <ds:schemaRefs>
-    <ds:schemaRef ds:uri="http://schemas.microsoft.com/sharepoint/v3/contenttype/forms"/>
-  </ds:schemaRefs>
-</ds:datastoreItem>
+<file path=customXml/item3.xml><?xml version="1.0" encoding="utf-8"?>
+<?mso-contentType ?>
+<FormTemplates xmlns="http://schemas.microsoft.com/sharepoint/v3/contenttype/forms">
+  <Display>DocumentLibraryForm</Display>
+  <Edit>DocumentLibraryForm</Edit>
+  <New>DocumentLibraryForm</New>
+</FormTemplates>
 </file>
 
-<file path=customXml/itemProps2.xml><?xml version="1.0" encoding="utf-8"?>
+<file path=customXml/itemProps1.xml><?xml version="1.0" encoding="utf-8"?>
 <ds:datastoreItem xmlns:ds="http://schemas.openxmlformats.org/officeDocument/2006/customXml" ds:itemID="{9B436524-1E59-45A9-9022-9518E43CCB5C}">
   <ds:schemaRefs>
     <ds:schemaRef ds:uri="http://schemas.microsoft.com/office/2006/metadata/contentType"/>
@@ -17418,7 +17385,7 @@
 </ds:datastoreItem>
 </file>
 
-<file path=customXml/itemProps3.xml><?xml version="1.0" encoding="utf-8"?>
+<file path=customXml/itemProps2.xml><?xml version="1.0" encoding="utf-8"?>
 <ds:datastoreItem xmlns:ds="http://schemas.openxmlformats.org/officeDocument/2006/customXml" ds:itemID="{137ABD09-FFEE-4830-B492-D9820D9FDFA2}">
   <ds:schemaRefs>
     <ds:schemaRef ds:uri="http://schemas.microsoft.com/office/infopath/2007/PartnerControls"/>
@@ -17432,4 +17399,12 @@
     <ds:schemaRef ds:uri="http://www.w3.org/XML/1998/namespace"/>
   </ds:schemaRefs>
 </ds:datastoreItem>
+</file>
+
+<file path=customXml/itemProps3.xml><?xml version="1.0" encoding="utf-8"?>
+<ds:datastoreItem xmlns:ds="http://schemas.openxmlformats.org/officeDocument/2006/customXml" ds:itemID="{D3F258A9-62F9-4AA7-BEBE-DE1957F67E4B}">
+  <ds:schemaRefs>
+    <ds:schemaRef ds:uri="http://schemas.microsoft.com/sharepoint/v3/contenttype/forms"/>
+  </ds:schemaRefs>
+</ds:datastoreItem>
 </file>
</xml_diff>

<commit_message>
Fix Slide 50 <=
</commit_message>
<xml_diff>
--- a/curriculum/Unit2/Unit2.pptx
+++ b/curriculum/Unit2/Unit2.pptx
@@ -207,10 +207,6 @@
 </p:presentation>
 </file>
 
-<file path=ppt/revisionInfo.xml><?xml version="1.0" encoding="utf-8"?>
-<p1510:revInfo xmlns:a="http://schemas.openxmlformats.org/drawingml/2006/main" xmlns:r="http://schemas.openxmlformats.org/officeDocument/2006/relationships" xmlns:p1510="http://schemas.microsoft.com/office/powerpoint/2015/10/main"/>
-</file>
-
 <file path=ppt/notesMasters/notesMaster1.xml><?xml version="1.0" encoding="utf-8"?>
 <p:notesMaster xmlns:a="http://schemas.openxmlformats.org/drawingml/2006/main" xmlns:r="http://schemas.openxmlformats.org/officeDocument/2006/relationships" xmlns:p="http://schemas.openxmlformats.org/presentationml/2006/main">
   <p:cSld>
@@ -293,7 +289,7 @@
           <a:p>
             <a:fld id="{01EE7243-FE3C-4092-BCD1-A3CEC92C371A}" type="datetimeFigureOut">
               <a:rPr lang="en-US" smtClean="0"/>
-              <a:t>9/30/2017</a:t>
+              <a:t>7/23/2019</a:t>
             </a:fld>
             <a:endParaRPr lang="en-US"/>
           </a:p>
@@ -2611,7 +2607,7 @@
           <a:p>
             <a:fld id="{04E6A347-E849-4263-9BF9-31A91B9AAA7C}" type="datetimeFigureOut">
               <a:rPr lang="en-US" smtClean="0"/>
-              <a:t>9/30/2017</a:t>
+              <a:t>7/23/2019</a:t>
             </a:fld>
             <a:endParaRPr lang="en-US"/>
           </a:p>
@@ -2779,7 +2775,7 @@
           <a:p>
             <a:fld id="{04E6A347-E849-4263-9BF9-31A91B9AAA7C}" type="datetimeFigureOut">
               <a:rPr lang="en-US" smtClean="0"/>
-              <a:t>9/30/2017</a:t>
+              <a:t>7/23/2019</a:t>
             </a:fld>
             <a:endParaRPr lang="en-US"/>
           </a:p>
@@ -2957,7 +2953,7 @@
           <a:p>
             <a:fld id="{04E6A347-E849-4263-9BF9-31A91B9AAA7C}" type="datetimeFigureOut">
               <a:rPr lang="en-US" smtClean="0"/>
-              <a:t>9/30/2017</a:t>
+              <a:t>7/23/2019</a:t>
             </a:fld>
             <a:endParaRPr lang="en-US"/>
           </a:p>
@@ -3125,7 +3121,7 @@
           <a:p>
             <a:fld id="{04E6A347-E849-4263-9BF9-31A91B9AAA7C}" type="datetimeFigureOut">
               <a:rPr lang="en-US" smtClean="0"/>
-              <a:t>9/30/2017</a:t>
+              <a:t>7/23/2019</a:t>
             </a:fld>
             <a:endParaRPr lang="en-US"/>
           </a:p>
@@ -3370,7 +3366,7 @@
           <a:p>
             <a:fld id="{04E6A347-E849-4263-9BF9-31A91B9AAA7C}" type="datetimeFigureOut">
               <a:rPr lang="en-US" smtClean="0"/>
-              <a:t>9/30/2017</a:t>
+              <a:t>7/23/2019</a:t>
             </a:fld>
             <a:endParaRPr lang="en-US"/>
           </a:p>
@@ -3599,7 +3595,7 @@
           <a:p>
             <a:fld id="{04E6A347-E849-4263-9BF9-31A91B9AAA7C}" type="datetimeFigureOut">
               <a:rPr lang="en-US" smtClean="0"/>
-              <a:t>9/30/2017</a:t>
+              <a:t>7/23/2019</a:t>
             </a:fld>
             <a:endParaRPr lang="en-US"/>
           </a:p>
@@ -3963,7 +3959,7 @@
           <a:p>
             <a:fld id="{04E6A347-E849-4263-9BF9-31A91B9AAA7C}" type="datetimeFigureOut">
               <a:rPr lang="en-US" smtClean="0"/>
-              <a:t>9/30/2017</a:t>
+              <a:t>7/23/2019</a:t>
             </a:fld>
             <a:endParaRPr lang="en-US"/>
           </a:p>
@@ -4080,7 +4076,7 @@
           <a:p>
             <a:fld id="{04E6A347-E849-4263-9BF9-31A91B9AAA7C}" type="datetimeFigureOut">
               <a:rPr lang="en-US" smtClean="0"/>
-              <a:t>9/30/2017</a:t>
+              <a:t>7/23/2019</a:t>
             </a:fld>
             <a:endParaRPr lang="en-US"/>
           </a:p>
@@ -4175,7 +4171,7 @@
           <a:p>
             <a:fld id="{04E6A347-E849-4263-9BF9-31A91B9AAA7C}" type="datetimeFigureOut">
               <a:rPr lang="en-US" smtClean="0"/>
-              <a:t>9/30/2017</a:t>
+              <a:t>7/23/2019</a:t>
             </a:fld>
             <a:endParaRPr lang="en-US"/>
           </a:p>
@@ -4450,7 +4446,7 @@
           <a:p>
             <a:fld id="{04E6A347-E849-4263-9BF9-31A91B9AAA7C}" type="datetimeFigureOut">
               <a:rPr lang="en-US" smtClean="0"/>
-              <a:t>9/30/2017</a:t>
+              <a:t>7/23/2019</a:t>
             </a:fld>
             <a:endParaRPr lang="en-US"/>
           </a:p>
@@ -4702,7 +4698,7 @@
           <a:p>
             <a:fld id="{04E6A347-E849-4263-9BF9-31A91B9AAA7C}" type="datetimeFigureOut">
               <a:rPr lang="en-US" smtClean="0"/>
-              <a:t>9/30/2017</a:t>
+              <a:t>7/23/2019</a:t>
             </a:fld>
             <a:endParaRPr lang="en-US"/>
           </a:p>
@@ -4913,7 +4909,7 @@
           <a:p>
             <a:fld id="{04E6A347-E849-4263-9BF9-31A91B9AAA7C}" type="datetimeFigureOut">
               <a:rPr lang="en-US" smtClean="0"/>
-              <a:t>9/30/2017</a:t>
+              <a:t>7/23/2019</a:t>
             </a:fld>
             <a:endParaRPr lang="en-US"/>
           </a:p>
@@ -11917,18 +11913,25 @@
               <a:t> = 1; </a:t>
             </a:r>
             <a:r>
-              <a:rPr lang="en-US" dirty="0" err="1">
+              <a:rPr lang="en-US" err="1">
                 <a:latin typeface="Courier New" panose="02070309020205020404" pitchFamily="49" charset="0"/>
                 <a:cs typeface="Courier New" panose="02070309020205020404" pitchFamily="49" charset="0"/>
               </a:rPr>
               <a:t>i</a:t>
             </a:r>
             <a:r>
+              <a:rPr lang="en-US">
+                <a:latin typeface="Courier New" panose="02070309020205020404" pitchFamily="49" charset="0"/>
+                <a:cs typeface="Courier New" panose="02070309020205020404" pitchFamily="49" charset="0"/>
+              </a:rPr>
+              <a:t> &lt;= </a:t>
+            </a:r>
+            <a:r>
               <a:rPr lang="en-US" dirty="0">
                 <a:latin typeface="Courier New" panose="02070309020205020404" pitchFamily="49" charset="0"/>
                 <a:cs typeface="Courier New" panose="02070309020205020404" pitchFamily="49" charset="0"/>
               </a:rPr>
-              <a:t> &lt; 1000; </a:t>
+              <a:t>1000; </a:t>
             </a:r>
             <a:r>
               <a:rPr lang="en-US" dirty="0" err="1">
@@ -17199,6 +17202,21 @@
 </file>
 
 <file path=customXml/item1.xml><?xml version="1.0" encoding="utf-8"?>
+<p:properties xmlns:p="http://schemas.microsoft.com/office/2006/metadata/properties" xmlns:xsi="http://www.w3.org/2001/XMLSchema-instance" xmlns:pc="http://schemas.microsoft.com/office/infopath/2007/PartnerControls">
+  <documentManagement/>
+</p:properties>
+</file>
+
+<file path=customXml/item2.xml><?xml version="1.0" encoding="utf-8"?>
+<?mso-contentType ?>
+<FormTemplates xmlns="http://schemas.microsoft.com/sharepoint/v3/contenttype/forms">
+  <Display>DocumentLibraryForm</Display>
+  <Edit>DocumentLibraryForm</Edit>
+  <New>DocumentLibraryForm</New>
+</FormTemplates>
+</file>
+
+<file path=customXml/item3.xml><?xml version="1.0" encoding="utf-8"?>
 <ct:contentTypeSchema xmlns:ct="http://schemas.microsoft.com/office/2006/metadata/contentType" xmlns:ma="http://schemas.microsoft.com/office/2006/metadata/properties/metaAttributes" ct:_="" ma:_="" ma:contentTypeName="Document" ma:contentTypeID="0x010100BABADD3A0624AA4E97287821B8F4D7D6" ma:contentTypeVersion="3" ma:contentTypeDescription="Create a new document." ma:contentTypeScope="" ma:versionID="d1f55a70bd1930e0ae5c5588ea58d234">
   <xsd:schema xmlns:xsd="http://www.w3.org/2001/XMLSchema" xmlns:xs="http://www.w3.org/2001/XMLSchema" xmlns:p="http://schemas.microsoft.com/office/2006/metadata/properties" xmlns:ns2="5edd459b-714d-42ed-b78f-512da7d1c14e" targetNamespace="http://schemas.microsoft.com/office/2006/metadata/properties" ma:root="true" ma:fieldsID="5a6a6e2895642296b7d1775ae73bc200" ns2:_="">
     <xsd:import namespace="5edd459b-714d-42ed-b78f-512da7d1c14e"/>
@@ -17352,22 +17370,31 @@
 </ct:contentTypeSchema>
 </file>
 
-<file path=customXml/item2.xml><?xml version="1.0" encoding="utf-8"?>
-<p:properties xmlns:p="http://schemas.microsoft.com/office/2006/metadata/properties" xmlns:xsi="http://www.w3.org/2001/XMLSchema-instance" xmlns:pc="http://schemas.microsoft.com/office/infopath/2007/PartnerControls">
-  <documentManagement/>
-</p:properties>
+<file path=customXml/itemProps1.xml><?xml version="1.0" encoding="utf-8"?>
+<ds:datastoreItem xmlns:ds="http://schemas.openxmlformats.org/officeDocument/2006/customXml" ds:itemID="{137ABD09-FFEE-4830-B492-D9820D9FDFA2}">
+  <ds:schemaRefs>
+    <ds:schemaRef ds:uri="http://schemas.microsoft.com/office/infopath/2007/PartnerControls"/>
+    <ds:schemaRef ds:uri="http://purl.org/dc/elements/1.1/"/>
+    <ds:schemaRef ds:uri="http://schemas.microsoft.com/office/2006/metadata/properties"/>
+    <ds:schemaRef ds:uri="http://schemas.microsoft.com/office/2006/documentManagement/types"/>
+    <ds:schemaRef ds:uri="http://purl.org/dc/terms/"/>
+    <ds:schemaRef ds:uri="http://schemas.openxmlformats.org/package/2006/metadata/core-properties"/>
+    <ds:schemaRef ds:uri="5edd459b-714d-42ed-b78f-512da7d1c14e"/>
+    <ds:schemaRef ds:uri="http://purl.org/dc/dcmitype/"/>
+    <ds:schemaRef ds:uri="http://www.w3.org/XML/1998/namespace"/>
+  </ds:schemaRefs>
+</ds:datastoreItem>
 </file>
 
-<file path=customXml/item3.xml><?xml version="1.0" encoding="utf-8"?>
-<?mso-contentType ?>
-<FormTemplates xmlns="http://schemas.microsoft.com/sharepoint/v3/contenttype/forms">
-  <Display>DocumentLibraryForm</Display>
-  <Edit>DocumentLibraryForm</Edit>
-  <New>DocumentLibraryForm</New>
-</FormTemplates>
+<file path=customXml/itemProps2.xml><?xml version="1.0" encoding="utf-8"?>
+<ds:datastoreItem xmlns:ds="http://schemas.openxmlformats.org/officeDocument/2006/customXml" ds:itemID="{D3F258A9-62F9-4AA7-BEBE-DE1957F67E4B}">
+  <ds:schemaRefs>
+    <ds:schemaRef ds:uri="http://schemas.microsoft.com/sharepoint/v3/contenttype/forms"/>
+  </ds:schemaRefs>
+</ds:datastoreItem>
 </file>
 
-<file path=customXml/itemProps1.xml><?xml version="1.0" encoding="utf-8"?>
+<file path=customXml/itemProps3.xml><?xml version="1.0" encoding="utf-8"?>
 <ds:datastoreItem xmlns:ds="http://schemas.openxmlformats.org/officeDocument/2006/customXml" ds:itemID="{9B436524-1E59-45A9-9022-9518E43CCB5C}">
   <ds:schemaRefs>
     <ds:schemaRef ds:uri="http://schemas.microsoft.com/office/2006/metadata/contentType"/>
@@ -17383,28 +17410,4 @@
     <ds:schemaRef ds:uri="http://schemas.microsoft.com/internal/obd"/>
   </ds:schemaRefs>
 </ds:datastoreItem>
-</file>
-
-<file path=customXml/itemProps2.xml><?xml version="1.0" encoding="utf-8"?>
-<ds:datastoreItem xmlns:ds="http://schemas.openxmlformats.org/officeDocument/2006/customXml" ds:itemID="{137ABD09-FFEE-4830-B492-D9820D9FDFA2}">
-  <ds:schemaRefs>
-    <ds:schemaRef ds:uri="http://schemas.microsoft.com/office/infopath/2007/PartnerControls"/>
-    <ds:schemaRef ds:uri="http://purl.org/dc/elements/1.1/"/>
-    <ds:schemaRef ds:uri="http://schemas.microsoft.com/office/2006/metadata/properties"/>
-    <ds:schemaRef ds:uri="http://schemas.microsoft.com/office/2006/documentManagement/types"/>
-    <ds:schemaRef ds:uri="http://purl.org/dc/terms/"/>
-    <ds:schemaRef ds:uri="http://schemas.openxmlformats.org/package/2006/metadata/core-properties"/>
-    <ds:schemaRef ds:uri="5edd459b-714d-42ed-b78f-512da7d1c14e"/>
-    <ds:schemaRef ds:uri="http://purl.org/dc/dcmitype/"/>
-    <ds:schemaRef ds:uri="http://www.w3.org/XML/1998/namespace"/>
-  </ds:schemaRefs>
-</ds:datastoreItem>
-</file>
-
-<file path=customXml/itemProps3.xml><?xml version="1.0" encoding="utf-8"?>
-<ds:datastoreItem xmlns:ds="http://schemas.openxmlformats.org/officeDocument/2006/customXml" ds:itemID="{D3F258A9-62F9-4AA7-BEBE-DE1957F67E4B}">
-  <ds:schemaRefs>
-    <ds:schemaRef ds:uri="http://schemas.microsoft.com/sharepoint/v3/contenttype/forms"/>
-  </ds:schemaRefs>
-</ds:datastoreItem>
 </file>
</xml_diff>